<commit_message>
corrigé des photos d'orthographe
</commit_message>
<xml_diff>
--- a/Cahier des charges.pptx
+++ b/Cahier des charges.pptx
@@ -326,7 +326,7 @@
           <a:p>
             <a:fld id="{06146A39-F410-4F42-8FF5-BA184CA32877}" type="datetimeFigureOut">
               <a:rPr lang="en-US" smtClean="0"/>
-              <a:t>2/2/2020</a:t>
+              <a:t>2/3/2020</a:t>
             </a:fld>
             <a:endParaRPr lang="en-US"/>
           </a:p>
@@ -762,7 +762,7 @@
           <a:p>
             <a:fld id="{06146A39-F410-4F42-8FF5-BA184CA32877}" type="datetimeFigureOut">
               <a:rPr lang="en-US" smtClean="0"/>
-              <a:t>2/2/2020</a:t>
+              <a:t>2/3/2020</a:t>
             </a:fld>
             <a:endParaRPr lang="en-US"/>
           </a:p>
@@ -1012,7 +1012,7 @@
           <a:p>
             <a:fld id="{06146A39-F410-4F42-8FF5-BA184CA32877}" type="datetimeFigureOut">
               <a:rPr lang="en-US" smtClean="0"/>
-              <a:t>2/2/2020</a:t>
+              <a:t>2/3/2020</a:t>
             </a:fld>
             <a:endParaRPr lang="en-US"/>
           </a:p>
@@ -1320,7 +1320,7 @@
           <a:p>
             <a:fld id="{06146A39-F410-4F42-8FF5-BA184CA32877}" type="datetimeFigureOut">
               <a:rPr lang="en-US" smtClean="0"/>
-              <a:t>2/2/2020</a:t>
+              <a:t>2/3/2020</a:t>
             </a:fld>
             <a:endParaRPr lang="en-US"/>
           </a:p>
@@ -1638,7 +1638,7 @@
           <a:p>
             <a:fld id="{06146A39-F410-4F42-8FF5-BA184CA32877}" type="datetimeFigureOut">
               <a:rPr lang="en-US" smtClean="0"/>
-              <a:t>2/2/2020</a:t>
+              <a:t>2/3/2020</a:t>
             </a:fld>
             <a:endParaRPr lang="en-US"/>
           </a:p>
@@ -1940,7 +1940,7 @@
           <a:p>
             <a:fld id="{06146A39-F410-4F42-8FF5-BA184CA32877}" type="datetimeFigureOut">
               <a:rPr lang="en-US" smtClean="0"/>
-              <a:t>2/2/2020</a:t>
+              <a:t>2/3/2020</a:t>
             </a:fld>
             <a:endParaRPr lang="en-US"/>
           </a:p>
@@ -2307,7 +2307,7 @@
           <a:p>
             <a:fld id="{06146A39-F410-4F42-8FF5-BA184CA32877}" type="datetimeFigureOut">
               <a:rPr lang="en-US" smtClean="0"/>
-              <a:t>2/2/2020</a:t>
+              <a:t>2/3/2020</a:t>
             </a:fld>
             <a:endParaRPr lang="en-US"/>
           </a:p>
@@ -2481,7 +2481,7 @@
           <a:p>
             <a:fld id="{06146A39-F410-4F42-8FF5-BA184CA32877}" type="datetimeFigureOut">
               <a:rPr lang="en-US" smtClean="0"/>
-              <a:t>2/2/2020</a:t>
+              <a:t>2/3/2020</a:t>
             </a:fld>
             <a:endParaRPr lang="en-US"/>
           </a:p>
@@ -2661,7 +2661,7 @@
           <a:p>
             <a:fld id="{06146A39-F410-4F42-8FF5-BA184CA32877}" type="datetimeFigureOut">
               <a:rPr lang="en-US" smtClean="0"/>
-              <a:t>2/2/2020</a:t>
+              <a:t>2/3/2020</a:t>
             </a:fld>
             <a:endParaRPr lang="en-US"/>
           </a:p>
@@ -2831,7 +2831,7 @@
           <a:p>
             <a:fld id="{06146A39-F410-4F42-8FF5-BA184CA32877}" type="datetimeFigureOut">
               <a:rPr lang="en-US" smtClean="0"/>
-              <a:t>2/2/2020</a:t>
+              <a:t>2/3/2020</a:t>
             </a:fld>
             <a:endParaRPr lang="en-US"/>
           </a:p>
@@ -3081,7 +3081,7 @@
           <a:p>
             <a:fld id="{06146A39-F410-4F42-8FF5-BA184CA32877}" type="datetimeFigureOut">
               <a:rPr lang="en-US" smtClean="0"/>
-              <a:t>2/2/2020</a:t>
+              <a:t>2/3/2020</a:t>
             </a:fld>
             <a:endParaRPr lang="en-US"/>
           </a:p>
@@ -3317,7 +3317,7 @@
           <a:p>
             <a:fld id="{06146A39-F410-4F42-8FF5-BA184CA32877}" type="datetimeFigureOut">
               <a:rPr lang="en-US" smtClean="0"/>
-              <a:t>2/2/2020</a:t>
+              <a:t>2/3/2020</a:t>
             </a:fld>
             <a:endParaRPr lang="en-US"/>
           </a:p>
@@ -3699,7 +3699,7 @@
           <a:p>
             <a:fld id="{06146A39-F410-4F42-8FF5-BA184CA32877}" type="datetimeFigureOut">
               <a:rPr lang="en-US" smtClean="0"/>
-              <a:t>2/2/2020</a:t>
+              <a:t>2/3/2020</a:t>
             </a:fld>
             <a:endParaRPr lang="en-US"/>
           </a:p>
@@ -3817,7 +3817,7 @@
           <a:p>
             <a:fld id="{06146A39-F410-4F42-8FF5-BA184CA32877}" type="datetimeFigureOut">
               <a:rPr lang="en-US" smtClean="0"/>
-              <a:t>2/2/2020</a:t>
+              <a:t>2/3/2020</a:t>
             </a:fld>
             <a:endParaRPr lang="en-US"/>
           </a:p>
@@ -3912,7 +3912,7 @@
           <a:p>
             <a:fld id="{06146A39-F410-4F42-8FF5-BA184CA32877}" type="datetimeFigureOut">
               <a:rPr lang="en-US" smtClean="0"/>
-              <a:t>2/2/2020</a:t>
+              <a:t>2/3/2020</a:t>
             </a:fld>
             <a:endParaRPr lang="en-US"/>
           </a:p>
@@ -4167,7 +4167,7 @@
           <a:p>
             <a:fld id="{06146A39-F410-4F42-8FF5-BA184CA32877}" type="datetimeFigureOut">
               <a:rPr lang="en-US" smtClean="0"/>
-              <a:t>2/2/2020</a:t>
+              <a:t>2/3/2020</a:t>
             </a:fld>
             <a:endParaRPr lang="en-US"/>
           </a:p>
@@ -4450,7 +4450,7 @@
           <a:p>
             <a:fld id="{06146A39-F410-4F42-8FF5-BA184CA32877}" type="datetimeFigureOut">
               <a:rPr lang="en-US" smtClean="0"/>
-              <a:t>2/2/2020</a:t>
+              <a:t>2/3/2020</a:t>
             </a:fld>
             <a:endParaRPr lang="en-US"/>
           </a:p>
@@ -4856,7 +4856,7 @@
           <a:p>
             <a:fld id="{06146A39-F410-4F42-8FF5-BA184CA32877}" type="datetimeFigureOut">
               <a:rPr lang="en-US" smtClean="0"/>
-              <a:t>2/2/2020</a:t>
+              <a:t>2/3/2020</a:t>
             </a:fld>
             <a:endParaRPr lang="en-US"/>
           </a:p>
@@ -7011,7 +7011,7 @@
               <a:buNone/>
             </a:pPr>
             <a:r>
-              <a:rPr lang="fr-MA" sz="4800" dirty="0" smtClean="0">
+              <a:rPr lang="fr-MA" sz="4800" smtClean="0">
                 <a:solidFill>
                   <a:srgbClr val="FF0000"/>
                 </a:solidFill>
@@ -7019,12 +7019,12 @@
               <a:t>                </a:t>
             </a:r>
             <a:r>
-              <a:rPr lang="fr-MA" sz="4800" dirty="0" err="1" smtClean="0">
+              <a:rPr lang="fr-MA" sz="4800" smtClean="0">
                 <a:solidFill>
                   <a:srgbClr val="FF0000"/>
                 </a:solidFill>
               </a:rPr>
-              <a:t>conclision</a:t>
+              <a:t>conclusion</a:t>
             </a:r>
             <a:endParaRPr lang="en-US" sz="4800" dirty="0">
               <a:solidFill>

</xml_diff>